<commit_message>
Adding github link in ppt
</commit_message>
<xml_diff>
--- a/presentation.pptx
+++ b/presentation.pptx
@@ -114,6 +114,11 @@
       </a:defRPr>
     </a:lvl9pPr>
   </p:defaultTextStyle>
+  <p:extLst>
+    <p:ext uri="{EFAFB233-063F-42B5-8137-9DF3F51BA10A}">
+      <p15:sldGuideLst xmlns:p15="http://schemas.microsoft.com/office/powerpoint/2012/main"/>
+    </p:ext>
+  </p:extLst>
 </p:presentation>
 </file>
 
@@ -3583,7 +3588,7 @@
           </a:ln>
           <a:extLst>
             <a:ext uri="{C572A759-6A51-4108-AA02-DFA0A04FC94B}">
-              <ma14:wrappingTextBoxFlag xmlns="" xmlns:m="http://schemas.openxmlformats.org/officeDocument/2006/math" xmlns:a14="http://schemas.microsoft.com/office/drawing/2010/main" xmlns:ma14="http://schemas.microsoft.com/office/mac/drawingml/2011/main" val="1"/>
+              <ma14:wrappingTextBoxFlag xmlns:ma14="http://schemas.microsoft.com/office/mac/drawingml/2011/main" xmlns:a14="http://schemas.microsoft.com/office/drawing/2010/main" xmlns:m="http://schemas.openxmlformats.org/officeDocument/2006/math" xmlns="" val="1"/>
             </a:ext>
           </a:extLst>
         </p:spPr>
@@ -3657,7 +3662,7 @@
           </a:ln>
           <a:extLst>
             <a:ext uri="{C572A759-6A51-4108-AA02-DFA0A04FC94B}">
-              <ma14:wrappingTextBoxFlag xmlns="" xmlns:m="http://schemas.openxmlformats.org/officeDocument/2006/math" xmlns:a14="http://schemas.microsoft.com/office/drawing/2010/main" xmlns:ma14="http://schemas.microsoft.com/office/mac/drawingml/2011/main" val="1"/>
+              <ma14:wrappingTextBoxFlag xmlns:ma14="http://schemas.microsoft.com/office/mac/drawingml/2011/main" xmlns:a14="http://schemas.microsoft.com/office/drawing/2010/main" xmlns:m="http://schemas.openxmlformats.org/officeDocument/2006/math" xmlns="" val="1"/>
             </a:ext>
           </a:extLst>
         </p:spPr>
@@ -3876,7 +3881,7 @@
           </a:ln>
           <a:extLst>
             <a:ext uri="{C572A759-6A51-4108-AA02-DFA0A04FC94B}">
-              <ma14:wrappingTextBoxFlag xmlns="" xmlns:m="http://schemas.openxmlformats.org/officeDocument/2006/math" xmlns:a14="http://schemas.microsoft.com/office/drawing/2010/main" xmlns:ma14="http://schemas.microsoft.com/office/mac/drawingml/2011/main" val="1"/>
+              <ma14:wrappingTextBoxFlag xmlns:ma14="http://schemas.microsoft.com/office/mac/drawingml/2011/main" xmlns:a14="http://schemas.microsoft.com/office/drawing/2010/main" xmlns:m="http://schemas.openxmlformats.org/officeDocument/2006/math" xmlns="" val="1"/>
             </a:ext>
           </a:extLst>
         </p:spPr>
@@ -3988,8 +3993,8 @@
         </p:nvSpPr>
         <p:spPr>
           <a:xfrm>
-            <a:off x="3283688" y="3030279"/>
-            <a:ext cx="5413744" cy="797442"/>
+            <a:off x="3283688" y="2498651"/>
+            <a:ext cx="5413744" cy="1329070"/>
           </a:xfrm>
           <a:prstGeom prst="rect">
             <a:avLst/>
@@ -3997,7 +4002,7 @@
         </p:spPr>
         <p:txBody>
           <a:bodyPr vert="horz" lIns="91440" tIns="45720" rIns="91440" bIns="45720" rtlCol="0" anchor="b">
-            <a:normAutofit/>
+            <a:normAutofit fontScale="90000"/>
           </a:bodyPr>
           <a:lstStyle/>
           <a:p>
@@ -4012,6 +4017,52 @@
               </a:rPr>
               <a:t>Code Walkthrough</a:t>
             </a:r>
+            <a:br>
+              <a:rPr lang="en-US" sz="5000" kern="1200" dirty="0">
+                <a:solidFill>
+                  <a:schemeClr val="tx1"/>
+                </a:solidFill>
+                <a:latin typeface="Adelle Sans Devanagari" panose="02000503000000020004" pitchFamily="2" charset="-78"/>
+                <a:cs typeface="Adelle Sans Devanagari" panose="02000503000000020004" pitchFamily="2" charset="-78"/>
+              </a:rPr>
+            </a:br>
+            <a:r>
+              <a:rPr lang="en-US" sz="1600" kern="1200" dirty="0">
+                <a:solidFill>
+                  <a:schemeClr val="tx1"/>
+                </a:solidFill>
+                <a:latin typeface="Adelle Sans Devanagari" panose="02000503000000020004" pitchFamily="2" charset="-78"/>
+                <a:cs typeface="Adelle Sans Devanagari" panose="02000503000000020004" pitchFamily="2" charset="-78"/>
+              </a:rPr>
+              <a:t>Link: </a:t>
+            </a:r>
+            <a:r>
+              <a:rPr lang="en-US" sz="1600" kern="1200" dirty="0">
+                <a:solidFill>
+                  <a:schemeClr val="tx1"/>
+                </a:solidFill>
+                <a:latin typeface="Adelle Sans Devanagari" panose="02000503000000020004" pitchFamily="2" charset="-78"/>
+                <a:cs typeface="Adelle Sans Devanagari" panose="02000503000000020004" pitchFamily="2" charset="-78"/>
+                <a:hlinkClick r:id="rId2"/>
+              </a:rPr>
+              <a:t>https://github.com/BalasubramanyamEvani/ScriptChain-Health-Assessment</a:t>
+            </a:r>
+            <a:br>
+              <a:rPr lang="en-US" sz="1600" kern="1200" dirty="0">
+                <a:solidFill>
+                  <a:schemeClr val="tx1"/>
+                </a:solidFill>
+                <a:latin typeface="Adelle Sans Devanagari" panose="02000503000000020004" pitchFamily="2" charset="-78"/>
+                <a:cs typeface="Adelle Sans Devanagari" panose="02000503000000020004" pitchFamily="2" charset="-78"/>
+              </a:rPr>
+            </a:br>
+            <a:endParaRPr lang="en-US" sz="1600" kern="1200" dirty="0">
+              <a:solidFill>
+                <a:schemeClr val="tx1"/>
+              </a:solidFill>
+              <a:latin typeface="Adelle Sans Devanagari" panose="02000503000000020004" pitchFamily="2" charset="-78"/>
+              <a:cs typeface="Adelle Sans Devanagari" panose="02000503000000020004" pitchFamily="2" charset="-78"/>
+            </a:endParaRPr>
           </a:p>
         </p:txBody>
       </p:sp>

</xml_diff>